<commit_message>
3_abnormal_detection 내용 설명 추가
</commit_message>
<xml_diff>
--- a/proj_AI/2nd week/3_이경원_abnormal_detection.pptx
+++ b/proj_AI/2nd week/3_이경원_abnormal_detection.pptx
@@ -602,7 +602,7 @@
                 <a:ea typeface="+mn-ea"/>
                 <a:cs typeface="+mn-cs"/>
               </a:rPr>
-              <a:t> 주제로 프로젝트를 진행한 바 있다</a:t>
+              <a:t> 주제로 프로젝트를 진행한 바 있습니다</a:t>
             </a:r>
             <a:r>
               <a:rPr lang="en-US" altLang="ko-KR" sz="1200" b="0" i="0" kern="1200" dirty="0">
@@ -722,7 +722,7 @@
                 <a:ea typeface="+mn-ea"/>
                 <a:cs typeface="+mn-cs"/>
               </a:rPr>
-              <a:t>모델로 폭력상황여부를 분류하였다</a:t>
+              <a:t>모델로 폭력상황여부를 분류하였습니다</a:t>
             </a:r>
             <a:r>
               <a:rPr lang="en-US" altLang="ko-KR" sz="1200" b="0" i="0" kern="1200" dirty="0">
@@ -734,19 +734,128 @@
                 <a:ea typeface="+mn-ea"/>
                 <a:cs typeface="+mn-cs"/>
               </a:rPr>
-              <a:t>.</a:t>
-            </a:r>
-            <a:endParaRPr lang="ko-KR" altLang="en-US" sz="1200" b="0" i="0" kern="1200" dirty="0">
-              <a:solidFill>
-                <a:schemeClr val="tx1"/>
-              </a:solidFill>
-              <a:effectLst/>
-              <a:latin typeface="+mn-lt"/>
-              <a:ea typeface="+mn-ea"/>
-              <a:cs typeface="+mn-cs"/>
-            </a:endParaRPr>
-          </a:p>
-          <a:p>
+              <a:t>. </a:t>
+            </a:r>
+            <a:r>
+              <a:rPr lang="ko-KR" altLang="en-US" sz="1200" b="0" i="0" kern="1200" dirty="0">
+                <a:solidFill>
+                  <a:schemeClr val="tx1"/>
+                </a:solidFill>
+                <a:effectLst/>
+                <a:latin typeface="+mn-lt"/>
+                <a:ea typeface="+mn-ea"/>
+                <a:cs typeface="+mn-cs"/>
+              </a:rPr>
+              <a:t>저희 팀은 </a:t>
+            </a:r>
+            <a:r>
+              <a:rPr lang="en-US" altLang="ko-KR" sz="1200" b="0" i="0" kern="1200" dirty="0">
+                <a:solidFill>
+                  <a:schemeClr val="tx1"/>
+                </a:solidFill>
+                <a:effectLst/>
+                <a:latin typeface="+mn-lt"/>
+                <a:ea typeface="+mn-ea"/>
+                <a:cs typeface="+mn-cs"/>
+              </a:rPr>
+              <a:t>7</a:t>
+            </a:r>
+            <a:r>
+              <a:rPr lang="ko-KR" altLang="en-US" sz="1200" b="0" i="0" kern="1200" dirty="0">
+                <a:solidFill>
+                  <a:schemeClr val="tx1"/>
+                </a:solidFill>
+                <a:effectLst/>
+                <a:latin typeface="+mn-lt"/>
+                <a:ea typeface="+mn-ea"/>
+                <a:cs typeface="+mn-cs"/>
+              </a:rPr>
+              <a:t>기의 </a:t>
+            </a:r>
+            <a:r>
+              <a:rPr lang="en-US" altLang="ko-KR" sz="1200" b="0" i="0" kern="1200" dirty="0">
+                <a:solidFill>
+                  <a:schemeClr val="tx1"/>
+                </a:solidFill>
+                <a:effectLst/>
+                <a:latin typeface="+mn-lt"/>
+                <a:ea typeface="+mn-ea"/>
+                <a:cs typeface="+mn-cs"/>
+              </a:rPr>
+              <a:t>violence detection</a:t>
+            </a:r>
+            <a:r>
+              <a:rPr lang="ko-KR" altLang="en-US" sz="1200" b="0" i="0" kern="1200" dirty="0">
+                <a:solidFill>
+                  <a:schemeClr val="tx1"/>
+                </a:solidFill>
+                <a:effectLst/>
+                <a:latin typeface="+mn-lt"/>
+                <a:ea typeface="+mn-ea"/>
+                <a:cs typeface="+mn-cs"/>
+              </a:rPr>
+              <a:t>모델을 참고하여</a:t>
+            </a:r>
+            <a:r>
+              <a:rPr lang="en-US" altLang="ko-KR" sz="1200" b="0" i="0" kern="1200" dirty="0">
+                <a:solidFill>
+                  <a:schemeClr val="tx1"/>
+                </a:solidFill>
+                <a:effectLst/>
+                <a:latin typeface="+mn-lt"/>
+                <a:ea typeface="+mn-ea"/>
+                <a:cs typeface="+mn-cs"/>
+              </a:rPr>
+              <a:t>?</a:t>
+            </a:r>
+            <a:r>
+              <a:rPr lang="ko-KR" altLang="en-US" sz="1200" b="0" i="0" kern="1200" dirty="0">
+                <a:solidFill>
+                  <a:schemeClr val="tx1"/>
+                </a:solidFill>
+                <a:effectLst/>
+                <a:latin typeface="+mn-lt"/>
+                <a:ea typeface="+mn-ea"/>
+                <a:cs typeface="+mn-cs"/>
+              </a:rPr>
+              <a:t> 학습자의 공부 여부를 판단할 수 있는 이상행동탐지</a:t>
+            </a:r>
+            <a:r>
+              <a:rPr lang="en-US" altLang="ko-KR" sz="1200" b="0" i="0" kern="1200" dirty="0">
+                <a:solidFill>
+                  <a:schemeClr val="tx1"/>
+                </a:solidFill>
+                <a:effectLst/>
+                <a:latin typeface="+mn-lt"/>
+                <a:ea typeface="+mn-ea"/>
+                <a:cs typeface="+mn-cs"/>
+              </a:rPr>
+              <a:t>(abnormal motion detection) </a:t>
+            </a:r>
+            <a:r>
+              <a:rPr lang="ko-KR" altLang="en-US" sz="1200" b="0" i="0" kern="1200" dirty="0">
+                <a:solidFill>
+                  <a:schemeClr val="tx1"/>
+                </a:solidFill>
+                <a:effectLst/>
+                <a:latin typeface="+mn-lt"/>
+                <a:ea typeface="+mn-ea"/>
+                <a:cs typeface="+mn-cs"/>
+              </a:rPr>
+              <a:t>모델로 발전시킬 예정입니다</a:t>
+            </a:r>
+            <a:r>
+              <a:rPr lang="en-US" altLang="ko-KR" sz="1200" b="0" i="0" kern="1200" dirty="0">
+                <a:solidFill>
+                  <a:schemeClr val="tx1"/>
+                </a:solidFill>
+                <a:effectLst/>
+                <a:latin typeface="+mn-lt"/>
+                <a:ea typeface="+mn-ea"/>
+                <a:cs typeface="+mn-cs"/>
+              </a:rPr>
+              <a:t>. </a:t>
+            </a:r>
             <a:endParaRPr lang="ko-KR" altLang="en-US" dirty="0"/>
           </a:p>
         </p:txBody>
@@ -893,15 +1002,15 @@
             </a:r>
             <a:r>
               <a:rPr lang="ko-KR" altLang="en-US" dirty="0"/>
-              <a:t>에서는 정상행동이라고 전혀 판단되었습니다</a:t>
+              <a:t>에서는 정상행동이라고 판단되었습니다</a:t>
             </a:r>
             <a:r>
               <a:rPr lang="en-US" altLang="ko-KR" dirty="0"/>
-              <a:t>. </a:t>
+              <a:t>. 7</a:t>
             </a:r>
             <a:r>
               <a:rPr lang="ko-KR" altLang="en-US" dirty="0"/>
-              <a:t>이 모델이 폭력 상황을 학습시켜 이를 이진분류 하였기 때문에 폭력상황과 같이 몸을 크게 움직이는 경우 이상행동으로 판단한다는 것을 알 수 있었습니다</a:t>
+              <a:t>기 모델이 폭력 상황을 학습시켜 이를 이진분류 하였기 때문에 폭력상황과 같이 몸을 크게 움직이는 경우 이상행동으로 판단한다는 것을 알 수 있었습니다</a:t>
             </a:r>
             <a:r>
               <a:rPr lang="en-US" altLang="ko-KR" dirty="0"/>
@@ -4245,8 +4354,8 @@
         </p:nvSpPr>
         <p:spPr>
           <a:xfrm>
-            <a:off x="4894378" y="2990052"/>
-            <a:ext cx="2423523" cy="387224"/>
+            <a:off x="4882551" y="2974791"/>
+            <a:ext cx="2437863" cy="417746"/>
           </a:xfrm>
           <a:prstGeom prst="rect">
             <a:avLst/>

</xml_diff>